<commit_message>
Class notes and the Rot13 program is mostly done
</commit_message>
<xml_diff>
--- a/class-notes/cs321-winter-2023-lecture-8-console-app-walkthrough.pptx
+++ b/class-notes/cs321-winter-2023-lecture-8-console-app-walkthrough.pptx
@@ -5,7 +5,7 @@
     <p:sldMasterId id="2147484010" r:id="rId1"/>
   </p:sldMasterIdLst>
   <p:notesMasterIdLst>
-    <p:notesMasterId r:id="rId67"/>
+    <p:notesMasterId r:id="rId80"/>
   </p:notesMasterIdLst>
   <p:sldIdLst>
     <p:sldId id="449" r:id="rId2"/>
@@ -72,24 +72,37 @@
     <p:sldId id="511" r:id="rId63"/>
     <p:sldId id="512" r:id="rId64"/>
     <p:sldId id="513" r:id="rId65"/>
-    <p:sldId id="508" r:id="rId66"/>
+    <p:sldId id="514" r:id="rId66"/>
+    <p:sldId id="515" r:id="rId67"/>
+    <p:sldId id="516" r:id="rId68"/>
+    <p:sldId id="517" r:id="rId69"/>
+    <p:sldId id="518" r:id="rId70"/>
+    <p:sldId id="519" r:id="rId71"/>
+    <p:sldId id="521" r:id="rId72"/>
+    <p:sldId id="520" r:id="rId73"/>
+    <p:sldId id="522" r:id="rId74"/>
+    <p:sldId id="523" r:id="rId75"/>
+    <p:sldId id="524" r:id="rId76"/>
+    <p:sldId id="525" r:id="rId77"/>
+    <p:sldId id="526" r:id="rId78"/>
+    <p:sldId id="527" r:id="rId79"/>
   </p:sldIdLst>
   <p:sldSz cx="18288000" cy="10287000"/>
   <p:notesSz cx="18288000" cy="10287000"/>
   <p:embeddedFontLst>
     <p:embeddedFont>
       <p:font typeface="Calibri" panose="020F0502020204030204" pitchFamily="34" charset="0"/>
-      <p:regular r:id="rId68"/>
-      <p:bold r:id="rId69"/>
-      <p:italic r:id="rId70"/>
-      <p:boldItalic r:id="rId71"/>
+      <p:regular r:id="rId81"/>
+      <p:bold r:id="rId82"/>
+      <p:italic r:id="rId83"/>
+      <p:boldItalic r:id="rId84"/>
     </p:embeddedFont>
     <p:embeddedFont>
       <p:font typeface="Corbel" panose="020B0503020204020204" pitchFamily="34" charset="0"/>
-      <p:regular r:id="rId72"/>
-      <p:bold r:id="rId73"/>
-      <p:italic r:id="rId74"/>
-      <p:boldItalic r:id="rId75"/>
+      <p:regular r:id="rId85"/>
+      <p:bold r:id="rId86"/>
+      <p:italic r:id="rId87"/>
+      <p:boldItalic r:id="rId88"/>
     </p:embeddedFont>
   </p:embeddedFontLst>
   <p:defaultTextStyle>
@@ -855,6 +868,90 @@
     <p:extLst>
       <p:ext uri="{BB962C8B-B14F-4D97-AF65-F5344CB8AC3E}">
         <p14:creationId xmlns:p14="http://schemas.microsoft.com/office/powerpoint/2010/main" val="4198295034"/>
+      </p:ext>
+    </p:extLst>
+  </p:cSld>
+  <p:clrMapOvr>
+    <a:masterClrMapping/>
+  </p:clrMapOvr>
+</p:notes>
+</file>
+
+<file path=ppt/notesSlides/notesSlide3.xml><?xml version="1.0" encoding="utf-8"?>
+<p:notes xmlns:a="http://schemas.openxmlformats.org/drawingml/2006/main" xmlns:r="http://schemas.openxmlformats.org/officeDocument/2006/relationships" xmlns:p="http://schemas.openxmlformats.org/presentationml/2006/main">
+  <p:cSld>
+    <p:spTree>
+      <p:nvGrpSpPr>
+        <p:cNvPr id="1" name=""/>
+        <p:cNvGrpSpPr/>
+        <p:nvPr/>
+      </p:nvGrpSpPr>
+      <p:grpSpPr>
+        <a:xfrm>
+          <a:off x="0" y="0"/>
+          <a:ext cx="0" cy="0"/>
+          <a:chOff x="0" y="0"/>
+          <a:chExt cx="0" cy="0"/>
+        </a:xfrm>
+      </p:grpSpPr>
+      <p:sp>
+        <p:nvSpPr>
+          <p:cNvPr id="2" name="Slide Image Placeholder 1"/>
+          <p:cNvSpPr>
+            <a:spLocks noGrp="1" noRot="1" noChangeAspect="1"/>
+          </p:cNvSpPr>
+          <p:nvPr>
+            <p:ph type="sldImg"/>
+          </p:nvPr>
+        </p:nvSpPr>
+        <p:spPr/>
+      </p:sp>
+      <p:sp>
+        <p:nvSpPr>
+          <p:cNvPr id="3" name="Notes Placeholder 2"/>
+          <p:cNvSpPr>
+            <a:spLocks noGrp="1"/>
+          </p:cNvSpPr>
+          <p:nvPr>
+            <p:ph type="body" idx="1"/>
+          </p:nvPr>
+        </p:nvSpPr>
+        <p:spPr/>
+        <p:txBody>
+          <a:bodyPr/>
+          <a:lstStyle/>
+          <a:p>
+            <a:endParaRPr lang="en-CA" dirty="0"/>
+          </a:p>
+        </p:txBody>
+      </p:sp>
+      <p:sp>
+        <p:nvSpPr>
+          <p:cNvPr id="4" name="Slide Number Placeholder 3"/>
+          <p:cNvSpPr>
+            <a:spLocks noGrp="1"/>
+          </p:cNvSpPr>
+          <p:nvPr>
+            <p:ph type="sldNum" sz="quarter" idx="5"/>
+          </p:nvPr>
+        </p:nvSpPr>
+        <p:spPr/>
+        <p:txBody>
+          <a:bodyPr/>
+          <a:lstStyle/>
+          <a:p>
+            <a:fld id="{406DC430-8259-49BD-A3AF-7901CB5ACC58}" type="slidenum">
+              <a:rPr lang="en-CA" smtClean="0"/>
+              <a:t>76</a:t>
+            </a:fld>
+            <a:endParaRPr lang="en-CA"/>
+          </a:p>
+        </p:txBody>
+      </p:sp>
+    </p:spTree>
+    <p:extLst>
+      <p:ext uri="{BB962C8B-B14F-4D97-AF65-F5344CB8AC3E}">
+        <p14:creationId xmlns:p14="http://schemas.microsoft.com/office/powerpoint/2010/main" val="4100035519"/>
       </p:ext>
     </p:extLst>
   </p:cSld>
@@ -10785,6 +10882,12 @@
             </a:r>
           </a:p>
           <a:p>
+            <a:r>
+              <a:rPr lang="en-CA" dirty="0"/>
+              <a:t>Lesson: things seem strange until you become accustomed to them</a:t>
+            </a:r>
+          </a:p>
+          <a:p>
             <a:endParaRPr lang="en-CA" dirty="0"/>
           </a:p>
         </p:txBody>
@@ -10824,7 +10927,7 @@
           <p:cNvPr id="2" name="Title 1">
             <a:extLst>
               <a:ext uri="{FF2B5EF4-FFF2-40B4-BE49-F238E27FC236}">
-                <a16:creationId xmlns:a16="http://schemas.microsoft.com/office/drawing/2014/main" id="{FE36181F-76B3-0CB8-EDE5-E34D4F0F7889}"/>
+                <a16:creationId xmlns:a16="http://schemas.microsoft.com/office/drawing/2014/main" id="{0C47F6ED-A22E-9B44-4569-206441976EBE}"/>
               </a:ext>
             </a:extLst>
           </p:cNvPr>
@@ -10842,7 +10945,7 @@
           <a:p>
             <a:r>
               <a:rPr lang="en-CA" dirty="0"/>
-              <a:t>To-do:</a:t>
+              <a:t>Using Directive</a:t>
             </a:r>
           </a:p>
         </p:txBody>
@@ -10852,7 +10955,7 @@
           <p:cNvPr id="3" name="Content Placeholder 2">
             <a:extLst>
               <a:ext uri="{FF2B5EF4-FFF2-40B4-BE49-F238E27FC236}">
-                <a16:creationId xmlns:a16="http://schemas.microsoft.com/office/drawing/2014/main" id="{295BB174-1D30-6A49-8C4B-0A37687BFAF4}"/>
+                <a16:creationId xmlns:a16="http://schemas.microsoft.com/office/drawing/2014/main" id="{234F30F8-92AA-F2F9-79EC-AE793284B1DA}"/>
               </a:ext>
             </a:extLst>
           </p:cNvPr>
@@ -10870,47 +10973,35 @@
           <a:p>
             <a:r>
               <a:rPr lang="en-CA" dirty="0"/>
-              <a:t>Using static </a:t>
-            </a:r>
-            <a:r>
-              <a:rPr lang="en-CA"/>
-              <a:t>(simplifying code)</a:t>
+              <a:t>We don’t need to have “Rot13.Program.” everywhere</a:t>
             </a:r>
           </a:p>
           <a:p>
             <a:r>
               <a:rPr lang="en-CA" dirty="0"/>
-              <a:t>Add command-line argument</a:t>
+              <a:t>It is because we haven’t included the namespace</a:t>
             </a:r>
           </a:p>
           <a:p>
             <a:r>
               <a:rPr lang="en-CA" dirty="0"/>
-              <a:t>Debug profiles example</a:t>
-            </a:r>
-          </a:p>
-          <a:p>
+              <a:t>Try adding a </a:t>
+            </a:r>
+            <a:r>
+              <a:rPr lang="en-CA" dirty="0">
+                <a:hlinkClick r:id="rId2"/>
+              </a:rPr>
+              <a:t>using directive</a:t>
+            </a:r>
             <a:r>
               <a:rPr lang="en-CA" dirty="0"/>
-              <a:t>Shared code: how and why? </a:t>
+              <a:t> (read-up on this)</a:t>
             </a:r>
           </a:p>
           <a:p>
             <a:r>
               <a:rPr lang="en-CA" dirty="0"/>
-              <a:t>Code reuse: when and why? </a:t>
-            </a:r>
-          </a:p>
-          <a:p>
-            <a:r>
-              <a:rPr lang="en-CA" dirty="0"/>
-              <a:t>Making code more reusable</a:t>
-            </a:r>
-          </a:p>
-          <a:p>
-            <a:r>
-              <a:rPr lang="en-CA" dirty="0"/>
-              <a:t>Refactor as we go: continuous improvement </a:t>
+              <a:t>We can now use “Program.”</a:t>
             </a:r>
           </a:p>
         </p:txBody>
@@ -10918,7 +11009,456 @@
     </p:spTree>
     <p:extLst>
       <p:ext uri="{BB962C8B-B14F-4D97-AF65-F5344CB8AC3E}">
-        <p14:creationId xmlns:p14="http://schemas.microsoft.com/office/powerpoint/2010/main" val="3672531997"/>
+        <p14:creationId xmlns:p14="http://schemas.microsoft.com/office/powerpoint/2010/main" val="57447451"/>
+      </p:ext>
+    </p:extLst>
+  </p:cSld>
+  <p:clrMapOvr>
+    <a:masterClrMapping/>
+  </p:clrMapOvr>
+</p:sld>
+</file>
+
+<file path=ppt/slides/slide66.xml><?xml version="1.0" encoding="utf-8"?>
+<p:sld xmlns:a="http://schemas.openxmlformats.org/drawingml/2006/main" xmlns:r="http://schemas.openxmlformats.org/officeDocument/2006/relationships" xmlns:p="http://schemas.openxmlformats.org/presentationml/2006/main">
+  <p:cSld>
+    <p:spTree>
+      <p:nvGrpSpPr>
+        <p:cNvPr id="1" name=""/>
+        <p:cNvGrpSpPr/>
+        <p:nvPr/>
+      </p:nvGrpSpPr>
+      <p:grpSpPr>
+        <a:xfrm>
+          <a:off x="0" y="0"/>
+          <a:ext cx="0" cy="0"/>
+          <a:chOff x="0" y="0"/>
+          <a:chExt cx="0" cy="0"/>
+        </a:xfrm>
+      </p:grpSpPr>
+      <p:sp>
+        <p:nvSpPr>
+          <p:cNvPr id="2" name="Title 1">
+            <a:extLst>
+              <a:ext uri="{FF2B5EF4-FFF2-40B4-BE49-F238E27FC236}">
+                <a16:creationId xmlns:a16="http://schemas.microsoft.com/office/drawing/2014/main" id="{8CBD0B56-9589-59B8-10EC-8415BA1E69AA}"/>
+              </a:ext>
+            </a:extLst>
+          </p:cNvPr>
+          <p:cNvSpPr>
+            <a:spLocks noGrp="1"/>
+          </p:cNvSpPr>
+          <p:nvPr>
+            <p:ph type="title"/>
+          </p:nvPr>
+        </p:nvSpPr>
+        <p:spPr/>
+        <p:txBody>
+          <a:bodyPr/>
+          <a:lstStyle/>
+          <a:p>
+            <a:r>
+              <a:rPr lang="en-CA" dirty="0"/>
+              <a:t>Isn’t this better?</a:t>
+            </a:r>
+          </a:p>
+        </p:txBody>
+      </p:sp>
+      <p:pic>
+        <p:nvPicPr>
+          <p:cNvPr id="5" name="Content Placeholder 4">
+            <a:extLst>
+              <a:ext uri="{FF2B5EF4-FFF2-40B4-BE49-F238E27FC236}">
+                <a16:creationId xmlns:a16="http://schemas.microsoft.com/office/drawing/2014/main" id="{7FDB374D-053B-8222-C15B-6500C5989BF7}"/>
+              </a:ext>
+            </a:extLst>
+          </p:cNvPr>
+          <p:cNvPicPr>
+            <a:picLocks noGrp="1" noChangeAspect="1"/>
+          </p:cNvPicPr>
+          <p:nvPr>
+            <p:ph idx="1"/>
+          </p:nvPr>
+        </p:nvPicPr>
+        <p:blipFill>
+          <a:blip r:embed="rId2"/>
+          <a:stretch>
+            <a:fillRect/>
+          </a:stretch>
+        </p:blipFill>
+        <p:spPr>
+          <a:xfrm>
+            <a:off x="9829800" y="3507757"/>
+            <a:ext cx="5401429" cy="5172797"/>
+          </a:xfrm>
+        </p:spPr>
+      </p:pic>
+      <p:pic>
+        <p:nvPicPr>
+          <p:cNvPr id="6" name="Picture 5">
+            <a:extLst>
+              <a:ext uri="{FF2B5EF4-FFF2-40B4-BE49-F238E27FC236}">
+                <a16:creationId xmlns:a16="http://schemas.microsoft.com/office/drawing/2014/main" id="{91339E6C-2CB7-6DDD-9409-419530B501E3}"/>
+              </a:ext>
+            </a:extLst>
+          </p:cNvPr>
+          <p:cNvPicPr>
+            <a:picLocks noChangeAspect="1"/>
+          </p:cNvPicPr>
+          <p:nvPr/>
+        </p:nvPicPr>
+        <p:blipFill>
+          <a:blip r:embed="rId3"/>
+          <a:stretch>
+            <a:fillRect/>
+          </a:stretch>
+        </p:blipFill>
+        <p:spPr>
+          <a:xfrm>
+            <a:off x="2209800" y="3596048"/>
+            <a:ext cx="6470539" cy="5105400"/>
+          </a:xfrm>
+          <a:prstGeom prst="rect">
+            <a:avLst/>
+          </a:prstGeom>
+        </p:spPr>
+      </p:pic>
+    </p:spTree>
+    <p:extLst>
+      <p:ext uri="{BB962C8B-B14F-4D97-AF65-F5344CB8AC3E}">
+        <p14:creationId xmlns:p14="http://schemas.microsoft.com/office/powerpoint/2010/main" val="467941361"/>
+      </p:ext>
+    </p:extLst>
+  </p:cSld>
+  <p:clrMapOvr>
+    <a:masterClrMapping/>
+  </p:clrMapOvr>
+</p:sld>
+</file>
+
+<file path=ppt/slides/slide67.xml><?xml version="1.0" encoding="utf-8"?>
+<p:sld xmlns:a="http://schemas.openxmlformats.org/drawingml/2006/main" xmlns:r="http://schemas.openxmlformats.org/officeDocument/2006/relationships" xmlns:p="http://schemas.openxmlformats.org/presentationml/2006/main">
+  <p:cSld>
+    <p:spTree>
+      <p:nvGrpSpPr>
+        <p:cNvPr id="1" name=""/>
+        <p:cNvGrpSpPr/>
+        <p:nvPr/>
+      </p:nvGrpSpPr>
+      <p:grpSpPr>
+        <a:xfrm>
+          <a:off x="0" y="0"/>
+          <a:ext cx="0" cy="0"/>
+          <a:chOff x="0" y="0"/>
+          <a:chExt cx="0" cy="0"/>
+        </a:xfrm>
+      </p:grpSpPr>
+      <p:sp>
+        <p:nvSpPr>
+          <p:cNvPr id="2" name="Title 1">
+            <a:extLst>
+              <a:ext uri="{FF2B5EF4-FFF2-40B4-BE49-F238E27FC236}">
+                <a16:creationId xmlns:a16="http://schemas.microsoft.com/office/drawing/2014/main" id="{B18B59AE-BA67-74F1-ADCF-303F3859B4D1}"/>
+              </a:ext>
+            </a:extLst>
+          </p:cNvPr>
+          <p:cNvSpPr>
+            <a:spLocks noGrp="1"/>
+          </p:cNvSpPr>
+          <p:nvPr>
+            <p:ph type="title"/>
+          </p:nvPr>
+        </p:nvSpPr>
+        <p:spPr/>
+        <p:txBody>
+          <a:bodyPr/>
+          <a:lstStyle/>
+          <a:p>
+            <a:r>
+              <a:rPr lang="en-CA" dirty="0"/>
+              <a:t>Using static</a:t>
+            </a:r>
+          </a:p>
+        </p:txBody>
+      </p:sp>
+      <p:sp>
+        <p:nvSpPr>
+          <p:cNvPr id="3" name="Content Placeholder 2">
+            <a:extLst>
+              <a:ext uri="{FF2B5EF4-FFF2-40B4-BE49-F238E27FC236}">
+                <a16:creationId xmlns:a16="http://schemas.microsoft.com/office/drawing/2014/main" id="{43B85B52-EB39-D473-E636-8B18CE0C1430}"/>
+              </a:ext>
+            </a:extLst>
+          </p:cNvPr>
+          <p:cNvSpPr>
+            <a:spLocks noGrp="1"/>
+          </p:cNvSpPr>
+          <p:nvPr>
+            <p:ph idx="1"/>
+          </p:nvPr>
+        </p:nvSpPr>
+        <p:spPr/>
+        <p:txBody>
+          <a:bodyPr/>
+          <a:lstStyle/>
+          <a:p>
+            <a:r>
+              <a:rPr lang="en-CA" dirty="0"/>
+              <a:t>We can simplify further with the </a:t>
+            </a:r>
+            <a:r>
+              <a:rPr lang="en-CA" dirty="0">
+                <a:hlinkClick r:id="rId2"/>
+              </a:rPr>
+              <a:t>“using static” directive</a:t>
+            </a:r>
+            <a:endParaRPr lang="en-CA" dirty="0"/>
+          </a:p>
+        </p:txBody>
+      </p:sp>
+      <p:pic>
+        <p:nvPicPr>
+          <p:cNvPr id="5" name="Picture 4">
+            <a:extLst>
+              <a:ext uri="{FF2B5EF4-FFF2-40B4-BE49-F238E27FC236}">
+                <a16:creationId xmlns:a16="http://schemas.microsoft.com/office/drawing/2014/main" id="{21893CA9-329B-4EA3-2519-AA4A28EDB687}"/>
+              </a:ext>
+            </a:extLst>
+          </p:cNvPr>
+          <p:cNvPicPr>
+            <a:picLocks noChangeAspect="1"/>
+          </p:cNvPicPr>
+          <p:nvPr/>
+        </p:nvPicPr>
+        <p:blipFill>
+          <a:blip r:embed="rId3"/>
+          <a:stretch>
+            <a:fillRect/>
+          </a:stretch>
+        </p:blipFill>
+        <p:spPr>
+          <a:xfrm>
+            <a:off x="2667000" y="4914900"/>
+            <a:ext cx="11607301" cy="2276569"/>
+          </a:xfrm>
+          <a:prstGeom prst="rect">
+            <a:avLst/>
+          </a:prstGeom>
+        </p:spPr>
+      </p:pic>
+    </p:spTree>
+    <p:extLst>
+      <p:ext uri="{BB962C8B-B14F-4D97-AF65-F5344CB8AC3E}">
+        <p14:creationId xmlns:p14="http://schemas.microsoft.com/office/powerpoint/2010/main" val="2127684130"/>
+      </p:ext>
+    </p:extLst>
+  </p:cSld>
+  <p:clrMapOvr>
+    <a:masterClrMapping/>
+  </p:clrMapOvr>
+</p:sld>
+</file>
+
+<file path=ppt/slides/slide68.xml><?xml version="1.0" encoding="utf-8"?>
+<p:sld xmlns:a="http://schemas.openxmlformats.org/drawingml/2006/main" xmlns:r="http://schemas.openxmlformats.org/officeDocument/2006/relationships" xmlns:p="http://schemas.openxmlformats.org/presentationml/2006/main">
+  <p:cSld>
+    <p:spTree>
+      <p:nvGrpSpPr>
+        <p:cNvPr id="1" name=""/>
+        <p:cNvGrpSpPr/>
+        <p:nvPr/>
+      </p:nvGrpSpPr>
+      <p:grpSpPr>
+        <a:xfrm>
+          <a:off x="0" y="0"/>
+          <a:ext cx="0" cy="0"/>
+          <a:chOff x="0" y="0"/>
+          <a:chExt cx="0" cy="0"/>
+        </a:xfrm>
+      </p:grpSpPr>
+      <p:sp>
+        <p:nvSpPr>
+          <p:cNvPr id="2" name="Title 1">
+            <a:extLst>
+              <a:ext uri="{FF2B5EF4-FFF2-40B4-BE49-F238E27FC236}">
+                <a16:creationId xmlns:a16="http://schemas.microsoft.com/office/drawing/2014/main" id="{9333F3F5-32DB-7CEB-582E-79F9B1E4C712}"/>
+              </a:ext>
+            </a:extLst>
+          </p:cNvPr>
+          <p:cNvSpPr>
+            <a:spLocks noGrp="1"/>
+          </p:cNvSpPr>
+          <p:nvPr>
+            <p:ph type="title"/>
+          </p:nvPr>
+        </p:nvSpPr>
+        <p:spPr/>
+        <p:txBody>
+          <a:bodyPr/>
+          <a:lstStyle/>
+          <a:p>
+            <a:r>
+              <a:rPr lang="en-CA" dirty="0"/>
+              <a:t>After Automated Refactoring</a:t>
+            </a:r>
+          </a:p>
+        </p:txBody>
+      </p:sp>
+      <p:pic>
+        <p:nvPicPr>
+          <p:cNvPr id="5" name="Content Placeholder 4">
+            <a:extLst>
+              <a:ext uri="{FF2B5EF4-FFF2-40B4-BE49-F238E27FC236}">
+                <a16:creationId xmlns:a16="http://schemas.microsoft.com/office/drawing/2014/main" id="{F8E29149-B040-8431-A7BE-F8CDBD6D4B36}"/>
+              </a:ext>
+            </a:extLst>
+          </p:cNvPr>
+          <p:cNvPicPr>
+            <a:picLocks noGrp="1" noChangeAspect="1"/>
+          </p:cNvPicPr>
+          <p:nvPr>
+            <p:ph idx="1"/>
+          </p:nvPr>
+        </p:nvPicPr>
+        <p:blipFill>
+          <a:blip r:embed="rId2"/>
+          <a:stretch>
+            <a:fillRect/>
+          </a:stretch>
+        </p:blipFill>
+        <p:spPr>
+          <a:xfrm>
+            <a:off x="5257800" y="3162300"/>
+            <a:ext cx="5506218" cy="5572903"/>
+          </a:xfrm>
+        </p:spPr>
+      </p:pic>
+    </p:spTree>
+    <p:extLst>
+      <p:ext uri="{BB962C8B-B14F-4D97-AF65-F5344CB8AC3E}">
+        <p14:creationId xmlns:p14="http://schemas.microsoft.com/office/powerpoint/2010/main" val="3645518435"/>
+      </p:ext>
+    </p:extLst>
+  </p:cSld>
+  <p:clrMapOvr>
+    <a:masterClrMapping/>
+  </p:clrMapOvr>
+</p:sld>
+</file>
+
+<file path=ppt/slides/slide69.xml><?xml version="1.0" encoding="utf-8"?>
+<p:sld xmlns:a="http://schemas.openxmlformats.org/drawingml/2006/main" xmlns:r="http://schemas.openxmlformats.org/officeDocument/2006/relationships" xmlns:p="http://schemas.openxmlformats.org/presentationml/2006/main">
+  <p:cSld>
+    <p:spTree>
+      <p:nvGrpSpPr>
+        <p:cNvPr id="1" name=""/>
+        <p:cNvGrpSpPr/>
+        <p:nvPr/>
+      </p:nvGrpSpPr>
+      <p:grpSpPr>
+        <a:xfrm>
+          <a:off x="0" y="0"/>
+          <a:ext cx="0" cy="0"/>
+          <a:chOff x="0" y="0"/>
+          <a:chExt cx="0" cy="0"/>
+        </a:xfrm>
+      </p:grpSpPr>
+      <p:sp>
+        <p:nvSpPr>
+          <p:cNvPr id="2" name="Title 1">
+            <a:extLst>
+              <a:ext uri="{FF2B5EF4-FFF2-40B4-BE49-F238E27FC236}">
+                <a16:creationId xmlns:a16="http://schemas.microsoft.com/office/drawing/2014/main" id="{A2E52D99-8465-15E9-374A-252F844C99D3}"/>
+              </a:ext>
+            </a:extLst>
+          </p:cNvPr>
+          <p:cNvSpPr>
+            <a:spLocks noGrp="1"/>
+          </p:cNvSpPr>
+          <p:nvPr>
+            <p:ph type="title"/>
+          </p:nvPr>
+        </p:nvSpPr>
+        <p:spPr/>
+        <p:txBody>
+          <a:bodyPr/>
+          <a:lstStyle/>
+          <a:p>
+            <a:r>
+              <a:rPr lang="en-CA" dirty="0"/>
+              <a:t>Wait … why still Program.Rot13</a:t>
+            </a:r>
+          </a:p>
+        </p:txBody>
+      </p:sp>
+      <p:sp>
+        <p:nvSpPr>
+          <p:cNvPr id="3" name="Content Placeholder 2">
+            <a:extLst>
+              <a:ext uri="{FF2B5EF4-FFF2-40B4-BE49-F238E27FC236}">
+                <a16:creationId xmlns:a16="http://schemas.microsoft.com/office/drawing/2014/main" id="{2231AA5F-5559-253C-D212-4CBBC348E3A3}"/>
+              </a:ext>
+            </a:extLst>
+          </p:cNvPr>
+          <p:cNvSpPr>
+            <a:spLocks noGrp="1"/>
+          </p:cNvSpPr>
+          <p:nvPr>
+            <p:ph idx="1"/>
+          </p:nvPr>
+        </p:nvSpPr>
+        <p:spPr/>
+        <p:txBody>
+          <a:bodyPr/>
+          <a:lstStyle/>
+          <a:p>
+            <a:r>
+              <a:rPr lang="en-CA" dirty="0"/>
+              <a:t>Because “Rot13” alone is ambiguous (namespace or function?)</a:t>
+            </a:r>
+          </a:p>
+          <a:p>
+            <a:endParaRPr lang="en-CA" dirty="0"/>
+          </a:p>
+          <a:p>
+            <a:endParaRPr lang="en-CA" dirty="0"/>
+          </a:p>
+        </p:txBody>
+      </p:sp>
+      <p:pic>
+        <p:nvPicPr>
+          <p:cNvPr id="5" name="Picture 4">
+            <a:extLst>
+              <a:ext uri="{FF2B5EF4-FFF2-40B4-BE49-F238E27FC236}">
+                <a16:creationId xmlns:a16="http://schemas.microsoft.com/office/drawing/2014/main" id="{FED7F5E4-2E3E-131C-FCD2-A11BAF504DBB}"/>
+              </a:ext>
+            </a:extLst>
+          </p:cNvPr>
+          <p:cNvPicPr>
+            <a:picLocks noChangeAspect="1"/>
+          </p:cNvPicPr>
+          <p:nvPr/>
+        </p:nvPicPr>
+        <p:blipFill>
+          <a:blip r:embed="rId2"/>
+          <a:stretch>
+            <a:fillRect/>
+          </a:stretch>
+        </p:blipFill>
+        <p:spPr>
+          <a:xfrm>
+            <a:off x="4648200" y="4076700"/>
+            <a:ext cx="8389872" cy="3962400"/>
+          </a:xfrm>
+          <a:prstGeom prst="rect">
+            <a:avLst/>
+          </a:prstGeom>
+        </p:spPr>
+      </p:pic>
+    </p:spTree>
+    <p:extLst>
+      <p:ext uri="{BB962C8B-B14F-4D97-AF65-F5344CB8AC3E}">
+        <p14:creationId xmlns:p14="http://schemas.microsoft.com/office/powerpoint/2010/main" val="2737898552"/>
       </p:ext>
     </p:extLst>
   </p:cSld>
@@ -11306,6 +11846,1216 @@
     <p:extLst>
       <p:ext uri="{BB962C8B-B14F-4D97-AF65-F5344CB8AC3E}">
         <p14:creationId xmlns:p14="http://schemas.microsoft.com/office/powerpoint/2010/main" val="2073259927"/>
+      </p:ext>
+    </p:extLst>
+  </p:cSld>
+  <p:clrMapOvr>
+    <a:masterClrMapping/>
+  </p:clrMapOvr>
+</p:sld>
+</file>
+
+<file path=ppt/slides/slide70.xml><?xml version="1.0" encoding="utf-8"?>
+<p:sld xmlns:a="http://schemas.openxmlformats.org/drawingml/2006/main" xmlns:r="http://schemas.openxmlformats.org/officeDocument/2006/relationships" xmlns:p="http://schemas.openxmlformats.org/presentationml/2006/main">
+  <p:cSld>
+    <p:spTree>
+      <p:nvGrpSpPr>
+        <p:cNvPr id="1" name=""/>
+        <p:cNvGrpSpPr/>
+        <p:nvPr/>
+      </p:nvGrpSpPr>
+      <p:grpSpPr>
+        <a:xfrm>
+          <a:off x="0" y="0"/>
+          <a:ext cx="0" cy="0"/>
+          <a:chOff x="0" y="0"/>
+          <a:chExt cx="0" cy="0"/>
+        </a:xfrm>
+      </p:grpSpPr>
+      <p:sp>
+        <p:nvSpPr>
+          <p:cNvPr id="2" name="Title 1">
+            <a:extLst>
+              <a:ext uri="{FF2B5EF4-FFF2-40B4-BE49-F238E27FC236}">
+                <a16:creationId xmlns:a16="http://schemas.microsoft.com/office/drawing/2014/main" id="{A5B111D5-9EF2-B30B-875C-F52F82CBE898}"/>
+              </a:ext>
+            </a:extLst>
+          </p:cNvPr>
+          <p:cNvSpPr>
+            <a:spLocks noGrp="1"/>
+          </p:cNvSpPr>
+          <p:nvPr>
+            <p:ph type="title"/>
+          </p:nvPr>
+        </p:nvSpPr>
+        <p:spPr/>
+        <p:txBody>
+          <a:bodyPr/>
+          <a:lstStyle/>
+          <a:p>
+            <a:r>
+              <a:rPr lang="en-CA" dirty="0"/>
+              <a:t>Moral</a:t>
+            </a:r>
+          </a:p>
+        </p:txBody>
+      </p:sp>
+      <p:sp>
+        <p:nvSpPr>
+          <p:cNvPr id="3" name="Content Placeholder 2">
+            <a:extLst>
+              <a:ext uri="{FF2B5EF4-FFF2-40B4-BE49-F238E27FC236}">
+                <a16:creationId xmlns:a16="http://schemas.microsoft.com/office/drawing/2014/main" id="{A1CE0302-2C6C-39DF-4163-DBE3A77A288C}"/>
+              </a:ext>
+            </a:extLst>
+          </p:cNvPr>
+          <p:cNvSpPr>
+            <a:spLocks noGrp="1"/>
+          </p:cNvSpPr>
+          <p:nvPr>
+            <p:ph idx="1"/>
+          </p:nvPr>
+        </p:nvSpPr>
+        <p:spPr/>
+        <p:txBody>
+          <a:bodyPr/>
+          <a:lstStyle/>
+          <a:p>
+            <a:r>
+              <a:rPr lang="en-CA" dirty="0"/>
+              <a:t>Simplify as much as you can but there are limits</a:t>
+            </a:r>
+          </a:p>
+          <a:p>
+            <a:r>
+              <a:rPr lang="en-CA" dirty="0"/>
+              <a:t>Compilers cannot guess what you meant if there is ambiguity</a:t>
+            </a:r>
+          </a:p>
+          <a:p>
+            <a:endParaRPr lang="en-CA" dirty="0"/>
+          </a:p>
+        </p:txBody>
+      </p:sp>
+    </p:spTree>
+    <p:extLst>
+      <p:ext uri="{BB962C8B-B14F-4D97-AF65-F5344CB8AC3E}">
+        <p14:creationId xmlns:p14="http://schemas.microsoft.com/office/powerpoint/2010/main" val="1555485210"/>
+      </p:ext>
+    </p:extLst>
+  </p:cSld>
+  <p:clrMapOvr>
+    <a:masterClrMapping/>
+  </p:clrMapOvr>
+</p:sld>
+</file>
+
+<file path=ppt/slides/slide71.xml><?xml version="1.0" encoding="utf-8"?>
+<p:sld xmlns:a="http://schemas.openxmlformats.org/drawingml/2006/main" xmlns:r="http://schemas.openxmlformats.org/officeDocument/2006/relationships" xmlns:p="http://schemas.openxmlformats.org/presentationml/2006/main">
+  <p:cSld>
+    <p:spTree>
+      <p:nvGrpSpPr>
+        <p:cNvPr id="1" name=""/>
+        <p:cNvGrpSpPr/>
+        <p:nvPr/>
+      </p:nvGrpSpPr>
+      <p:grpSpPr>
+        <a:xfrm>
+          <a:off x="0" y="0"/>
+          <a:ext cx="0" cy="0"/>
+          <a:chOff x="0" y="0"/>
+          <a:chExt cx="0" cy="0"/>
+        </a:xfrm>
+      </p:grpSpPr>
+      <p:sp>
+        <p:nvSpPr>
+          <p:cNvPr id="2" name="Title 1">
+            <a:extLst>
+              <a:ext uri="{FF2B5EF4-FFF2-40B4-BE49-F238E27FC236}">
+                <a16:creationId xmlns:a16="http://schemas.microsoft.com/office/drawing/2014/main" id="{4777CC30-82FA-C0A9-17D7-4BA8D89D423A}"/>
+              </a:ext>
+            </a:extLst>
+          </p:cNvPr>
+          <p:cNvSpPr>
+            <a:spLocks noGrp="1"/>
+          </p:cNvSpPr>
+          <p:nvPr>
+            <p:ph type="title"/>
+          </p:nvPr>
+        </p:nvSpPr>
+        <p:spPr/>
+        <p:txBody>
+          <a:bodyPr/>
+          <a:lstStyle/>
+          <a:p>
+            <a:r>
+              <a:rPr lang="en-CA" dirty="0"/>
+              <a:t>What if we want to read from a file?</a:t>
+            </a:r>
+          </a:p>
+        </p:txBody>
+      </p:sp>
+      <p:pic>
+        <p:nvPicPr>
+          <p:cNvPr id="5" name="Content Placeholder 4">
+            <a:extLst>
+              <a:ext uri="{FF2B5EF4-FFF2-40B4-BE49-F238E27FC236}">
+                <a16:creationId xmlns:a16="http://schemas.microsoft.com/office/drawing/2014/main" id="{05DC69F5-9552-34CC-D952-5B76162E35DD}"/>
+              </a:ext>
+            </a:extLst>
+          </p:cNvPr>
+          <p:cNvPicPr>
+            <a:picLocks noGrp="1" noChangeAspect="1"/>
+          </p:cNvPicPr>
+          <p:nvPr>
+            <p:ph idx="1"/>
+          </p:nvPr>
+        </p:nvPicPr>
+        <p:blipFill>
+          <a:blip r:embed="rId2"/>
+          <a:stretch>
+            <a:fillRect/>
+          </a:stretch>
+        </p:blipFill>
+        <p:spPr>
+          <a:xfrm>
+            <a:off x="3200400" y="3971761"/>
+            <a:ext cx="12030203" cy="2924339"/>
+          </a:xfrm>
+        </p:spPr>
+      </p:pic>
+    </p:spTree>
+    <p:extLst>
+      <p:ext uri="{BB962C8B-B14F-4D97-AF65-F5344CB8AC3E}">
+        <p14:creationId xmlns:p14="http://schemas.microsoft.com/office/powerpoint/2010/main" val="2383527262"/>
+      </p:ext>
+    </p:extLst>
+  </p:cSld>
+  <p:clrMapOvr>
+    <a:masterClrMapping/>
+  </p:clrMapOvr>
+</p:sld>
+</file>
+
+<file path=ppt/slides/slide72.xml><?xml version="1.0" encoding="utf-8"?>
+<p:sld xmlns:a="http://schemas.openxmlformats.org/drawingml/2006/main" xmlns:r="http://schemas.openxmlformats.org/officeDocument/2006/relationships" xmlns:p="http://schemas.openxmlformats.org/presentationml/2006/main">
+  <p:cSld>
+    <p:spTree>
+      <p:nvGrpSpPr>
+        <p:cNvPr id="1" name=""/>
+        <p:cNvGrpSpPr/>
+        <p:nvPr/>
+      </p:nvGrpSpPr>
+      <p:grpSpPr>
+        <a:xfrm>
+          <a:off x="0" y="0"/>
+          <a:ext cx="0" cy="0"/>
+          <a:chOff x="0" y="0"/>
+          <a:chExt cx="0" cy="0"/>
+        </a:xfrm>
+      </p:grpSpPr>
+      <p:sp>
+        <p:nvSpPr>
+          <p:cNvPr id="2" name="Title 1">
+            <a:extLst>
+              <a:ext uri="{FF2B5EF4-FFF2-40B4-BE49-F238E27FC236}">
+                <a16:creationId xmlns:a16="http://schemas.microsoft.com/office/drawing/2014/main" id="{DC6E2170-8A7F-A00D-D612-DA2E366FFE30}"/>
+              </a:ext>
+            </a:extLst>
+          </p:cNvPr>
+          <p:cNvSpPr>
+            <a:spLocks noGrp="1"/>
+          </p:cNvSpPr>
+          <p:nvPr>
+            <p:ph type="title"/>
+          </p:nvPr>
+        </p:nvSpPr>
+        <p:spPr/>
+        <p:txBody>
+          <a:bodyPr/>
+          <a:lstStyle/>
+          <a:p>
+            <a:r>
+              <a:rPr lang="en-CA" dirty="0"/>
+              <a:t>Parsing Command Line Arguments</a:t>
+            </a:r>
+          </a:p>
+        </p:txBody>
+      </p:sp>
+      <p:pic>
+        <p:nvPicPr>
+          <p:cNvPr id="5" name="Content Placeholder 4">
+            <a:extLst>
+              <a:ext uri="{FF2B5EF4-FFF2-40B4-BE49-F238E27FC236}">
+                <a16:creationId xmlns:a16="http://schemas.microsoft.com/office/drawing/2014/main" id="{A8EA3C65-AC2C-E5B7-F0D3-CAAB8FE630AC}"/>
+              </a:ext>
+            </a:extLst>
+          </p:cNvPr>
+          <p:cNvPicPr>
+            <a:picLocks noGrp="1" noChangeAspect="1"/>
+          </p:cNvPicPr>
+          <p:nvPr>
+            <p:ph idx="1"/>
+          </p:nvPr>
+        </p:nvPicPr>
+        <p:blipFill>
+          <a:blip r:embed="rId2"/>
+          <a:stretch>
+            <a:fillRect/>
+          </a:stretch>
+        </p:blipFill>
+        <p:spPr>
+          <a:xfrm>
+            <a:off x="1981200" y="3771900"/>
+            <a:ext cx="13539862" cy="3947161"/>
+          </a:xfrm>
+        </p:spPr>
+      </p:pic>
+    </p:spTree>
+    <p:extLst>
+      <p:ext uri="{BB962C8B-B14F-4D97-AF65-F5344CB8AC3E}">
+        <p14:creationId xmlns:p14="http://schemas.microsoft.com/office/powerpoint/2010/main" val="736188705"/>
+      </p:ext>
+    </p:extLst>
+  </p:cSld>
+  <p:clrMapOvr>
+    <a:masterClrMapping/>
+  </p:clrMapOvr>
+</p:sld>
+</file>
+
+<file path=ppt/slides/slide73.xml><?xml version="1.0" encoding="utf-8"?>
+<p:sld xmlns:a="http://schemas.openxmlformats.org/drawingml/2006/main" xmlns:r="http://schemas.openxmlformats.org/officeDocument/2006/relationships" xmlns:p="http://schemas.openxmlformats.org/presentationml/2006/main">
+  <p:cSld>
+    <p:spTree>
+      <p:nvGrpSpPr>
+        <p:cNvPr id="1" name=""/>
+        <p:cNvGrpSpPr/>
+        <p:nvPr/>
+      </p:nvGrpSpPr>
+      <p:grpSpPr>
+        <a:xfrm>
+          <a:off x="0" y="0"/>
+          <a:ext cx="0" cy="0"/>
+          <a:chOff x="0" y="0"/>
+          <a:chExt cx="0" cy="0"/>
+        </a:xfrm>
+      </p:grpSpPr>
+      <p:sp>
+        <p:nvSpPr>
+          <p:cNvPr id="2" name="Title 1">
+            <a:extLst>
+              <a:ext uri="{FF2B5EF4-FFF2-40B4-BE49-F238E27FC236}">
+                <a16:creationId xmlns:a16="http://schemas.microsoft.com/office/drawing/2014/main" id="{8BFFF192-EF71-7B4B-A143-1DBF209D593F}"/>
+              </a:ext>
+            </a:extLst>
+          </p:cNvPr>
+          <p:cNvSpPr>
+            <a:spLocks noGrp="1"/>
+          </p:cNvSpPr>
+          <p:nvPr>
+            <p:ph type="title"/>
+          </p:nvPr>
+        </p:nvSpPr>
+        <p:spPr/>
+        <p:txBody>
+          <a:bodyPr/>
+          <a:lstStyle/>
+          <a:p>
+            <a:r>
+              <a:rPr lang="en-CA" dirty="0"/>
+              <a:t>Manual Testing of Command Line</a:t>
+            </a:r>
+          </a:p>
+        </p:txBody>
+      </p:sp>
+      <p:pic>
+        <p:nvPicPr>
+          <p:cNvPr id="5" name="Content Placeholder 4">
+            <a:extLst>
+              <a:ext uri="{FF2B5EF4-FFF2-40B4-BE49-F238E27FC236}">
+                <a16:creationId xmlns:a16="http://schemas.microsoft.com/office/drawing/2014/main" id="{605A5039-921C-BC4B-8FDD-A8F8CB400075}"/>
+              </a:ext>
+            </a:extLst>
+          </p:cNvPr>
+          <p:cNvPicPr>
+            <a:picLocks noGrp="1" noChangeAspect="1"/>
+          </p:cNvPicPr>
+          <p:nvPr>
+            <p:ph idx="1"/>
+          </p:nvPr>
+        </p:nvPicPr>
+        <p:blipFill>
+          <a:blip r:embed="rId2"/>
+          <a:stretch>
+            <a:fillRect/>
+          </a:stretch>
+        </p:blipFill>
+        <p:spPr>
+          <a:xfrm>
+            <a:off x="2667000" y="4000500"/>
+            <a:ext cx="12505496" cy="2971800"/>
+          </a:xfrm>
+        </p:spPr>
+      </p:pic>
+    </p:spTree>
+    <p:extLst>
+      <p:ext uri="{BB962C8B-B14F-4D97-AF65-F5344CB8AC3E}">
+        <p14:creationId xmlns:p14="http://schemas.microsoft.com/office/powerpoint/2010/main" val="3772221591"/>
+      </p:ext>
+    </p:extLst>
+  </p:cSld>
+  <p:clrMapOvr>
+    <a:masterClrMapping/>
+  </p:clrMapOvr>
+</p:sld>
+</file>
+
+<file path=ppt/slides/slide74.xml><?xml version="1.0" encoding="utf-8"?>
+<p:sld xmlns:a="http://schemas.openxmlformats.org/drawingml/2006/main" xmlns:r="http://schemas.openxmlformats.org/officeDocument/2006/relationships" xmlns:p="http://schemas.openxmlformats.org/presentationml/2006/main">
+  <p:cSld>
+    <p:spTree>
+      <p:nvGrpSpPr>
+        <p:cNvPr id="1" name=""/>
+        <p:cNvGrpSpPr/>
+        <p:nvPr/>
+      </p:nvGrpSpPr>
+      <p:grpSpPr>
+        <a:xfrm>
+          <a:off x="0" y="0"/>
+          <a:ext cx="0" cy="0"/>
+          <a:chOff x="0" y="0"/>
+          <a:chExt cx="0" cy="0"/>
+        </a:xfrm>
+      </p:grpSpPr>
+      <p:sp>
+        <p:nvSpPr>
+          <p:cNvPr id="2" name="Title 1">
+            <a:extLst>
+              <a:ext uri="{FF2B5EF4-FFF2-40B4-BE49-F238E27FC236}">
+                <a16:creationId xmlns:a16="http://schemas.microsoft.com/office/drawing/2014/main" id="{7764953B-3D6E-65D5-5B95-2363D3666095}"/>
+              </a:ext>
+            </a:extLst>
+          </p:cNvPr>
+          <p:cNvSpPr>
+            <a:spLocks noGrp="1"/>
+          </p:cNvSpPr>
+          <p:nvPr>
+            <p:ph type="title"/>
+          </p:nvPr>
+        </p:nvSpPr>
+        <p:spPr/>
+        <p:txBody>
+          <a:bodyPr/>
+          <a:lstStyle/>
+          <a:p>
+            <a:r>
+              <a:rPr lang="en-CA" dirty="0"/>
+              <a:t>Launches the Debug Profiles Menu</a:t>
+            </a:r>
+          </a:p>
+        </p:txBody>
+      </p:sp>
+      <p:pic>
+        <p:nvPicPr>
+          <p:cNvPr id="5" name="Content Placeholder 4">
+            <a:extLst>
+              <a:ext uri="{FF2B5EF4-FFF2-40B4-BE49-F238E27FC236}">
+                <a16:creationId xmlns:a16="http://schemas.microsoft.com/office/drawing/2014/main" id="{CBF7273F-3EB7-8999-286A-46DFFBE17658}"/>
+              </a:ext>
+            </a:extLst>
+          </p:cNvPr>
+          <p:cNvPicPr>
+            <a:picLocks noGrp="1" noChangeAspect="1"/>
+          </p:cNvPicPr>
+          <p:nvPr>
+            <p:ph idx="1"/>
+          </p:nvPr>
+        </p:nvPicPr>
+        <p:blipFill>
+          <a:blip r:embed="rId2"/>
+          <a:stretch>
+            <a:fillRect/>
+          </a:stretch>
+        </p:blipFill>
+        <p:spPr>
+          <a:xfrm>
+            <a:off x="4495799" y="2948940"/>
+            <a:ext cx="8759643" cy="5775960"/>
+          </a:xfrm>
+        </p:spPr>
+      </p:pic>
+    </p:spTree>
+    <p:extLst>
+      <p:ext uri="{BB962C8B-B14F-4D97-AF65-F5344CB8AC3E}">
+        <p14:creationId xmlns:p14="http://schemas.microsoft.com/office/powerpoint/2010/main" val="2942065152"/>
+      </p:ext>
+    </p:extLst>
+  </p:cSld>
+  <p:clrMapOvr>
+    <a:masterClrMapping/>
+  </p:clrMapOvr>
+</p:sld>
+</file>
+
+<file path=ppt/slides/slide75.xml><?xml version="1.0" encoding="utf-8"?>
+<p:sld xmlns:a="http://schemas.openxmlformats.org/drawingml/2006/main" xmlns:r="http://schemas.openxmlformats.org/officeDocument/2006/relationships" xmlns:p="http://schemas.openxmlformats.org/presentationml/2006/main">
+  <p:cSld>
+    <p:spTree>
+      <p:nvGrpSpPr>
+        <p:cNvPr id="1" name=""/>
+        <p:cNvGrpSpPr/>
+        <p:nvPr/>
+      </p:nvGrpSpPr>
+      <p:grpSpPr>
+        <a:xfrm>
+          <a:off x="0" y="0"/>
+          <a:ext cx="0" cy="0"/>
+          <a:chOff x="0" y="0"/>
+          <a:chExt cx="0" cy="0"/>
+        </a:xfrm>
+      </p:grpSpPr>
+      <p:sp>
+        <p:nvSpPr>
+          <p:cNvPr id="2" name="Title 1">
+            <a:extLst>
+              <a:ext uri="{FF2B5EF4-FFF2-40B4-BE49-F238E27FC236}">
+                <a16:creationId xmlns:a16="http://schemas.microsoft.com/office/drawing/2014/main" id="{B7722DBC-0F48-33C8-4C7F-47EA871AF4B7}"/>
+              </a:ext>
+            </a:extLst>
+          </p:cNvPr>
+          <p:cNvSpPr>
+            <a:spLocks noGrp="1"/>
+          </p:cNvSpPr>
+          <p:nvPr>
+            <p:ph type="title"/>
+          </p:nvPr>
+        </p:nvSpPr>
+        <p:spPr/>
+        <p:txBody>
+          <a:bodyPr/>
+          <a:lstStyle/>
+          <a:p>
+            <a:r>
+              <a:rPr lang="en-CA" dirty="0"/>
+              <a:t>Set the Command Line Argument</a:t>
+            </a:r>
+          </a:p>
+        </p:txBody>
+      </p:sp>
+      <p:pic>
+        <p:nvPicPr>
+          <p:cNvPr id="5" name="Content Placeholder 4">
+            <a:extLst>
+              <a:ext uri="{FF2B5EF4-FFF2-40B4-BE49-F238E27FC236}">
+                <a16:creationId xmlns:a16="http://schemas.microsoft.com/office/drawing/2014/main" id="{2EE29472-03D2-04A2-649A-62EDF04FD288}"/>
+              </a:ext>
+            </a:extLst>
+          </p:cNvPr>
+          <p:cNvPicPr>
+            <a:picLocks noGrp="1" noChangeAspect="1"/>
+          </p:cNvPicPr>
+          <p:nvPr>
+            <p:ph idx="1"/>
+          </p:nvPr>
+        </p:nvPicPr>
+        <p:blipFill>
+          <a:blip r:embed="rId2"/>
+          <a:stretch>
+            <a:fillRect/>
+          </a:stretch>
+        </p:blipFill>
+        <p:spPr>
+          <a:xfrm>
+            <a:off x="5394599" y="3690599"/>
+            <a:ext cx="7449590" cy="4848902"/>
+          </a:xfrm>
+        </p:spPr>
+      </p:pic>
+    </p:spTree>
+    <p:extLst>
+      <p:ext uri="{BB962C8B-B14F-4D97-AF65-F5344CB8AC3E}">
+        <p14:creationId xmlns:p14="http://schemas.microsoft.com/office/powerpoint/2010/main" val="3277202859"/>
+      </p:ext>
+    </p:extLst>
+  </p:cSld>
+  <p:clrMapOvr>
+    <a:masterClrMapping/>
+  </p:clrMapOvr>
+</p:sld>
+</file>
+
+<file path=ppt/slides/slide76.xml><?xml version="1.0" encoding="utf-8"?>
+<p:sld xmlns:a="http://schemas.openxmlformats.org/drawingml/2006/main" xmlns:r="http://schemas.openxmlformats.org/officeDocument/2006/relationships" xmlns:p="http://schemas.openxmlformats.org/presentationml/2006/main">
+  <p:cSld>
+    <p:bg>
+      <p:bgPr>
+        <a:solidFill>
+          <a:schemeClr val="accent1"/>
+        </a:solidFill>
+        <a:effectLst/>
+      </p:bgPr>
+    </p:bg>
+    <p:spTree>
+      <p:nvGrpSpPr>
+        <p:cNvPr id="1" name=""/>
+        <p:cNvGrpSpPr/>
+        <p:nvPr/>
+      </p:nvGrpSpPr>
+      <p:grpSpPr>
+        <a:xfrm>
+          <a:off x="0" y="0"/>
+          <a:ext cx="0" cy="0"/>
+          <a:chOff x="0" y="0"/>
+          <a:chExt cx="0" cy="0"/>
+        </a:xfrm>
+      </p:grpSpPr>
+      <p:sp>
+        <p:nvSpPr>
+          <p:cNvPr id="10" name="Rectangle 9">
+            <a:extLst>
+              <a:ext uri="{FF2B5EF4-FFF2-40B4-BE49-F238E27FC236}">
+                <a16:creationId xmlns:a16="http://schemas.microsoft.com/office/drawing/2014/main" id="{79CBD3C9-4E66-426D-948E-7CF4778107E8}"/>
+              </a:ext>
+              <a:ext uri="{C183D7F6-B498-43B3-948B-1728B52AA6E4}">
+                <adec:decorative xmlns:adec="http://schemas.microsoft.com/office/drawing/2017/decorative" val="1"/>
+              </a:ext>
+            </a:extLst>
+          </p:cNvPr>
+          <p:cNvSpPr>
+            <a:spLocks noGrp="1" noRot="1" noChangeAspect="1" noMove="1" noResize="1" noEditPoints="1" noAdjustHandles="1" noChangeArrowheads="1" noChangeShapeType="1" noTextEdit="1"/>
+          </p:cNvSpPr>
+          <p:nvPr>
+            <p:extLst>
+              <p:ext uri="{386F3935-93C4-4BCD-93E2-E3B085C9AB24}">
+                <p16:designElem xmlns:p16="http://schemas.microsoft.com/office/powerpoint/2015/main" val="1"/>
+              </p:ext>
+            </p:extLst>
+          </p:nvPr>
+        </p:nvSpPr>
+        <p:spPr>
+          <a:xfrm>
+            <a:off x="346710" y="365760"/>
+            <a:ext cx="17586960" cy="9566908"/>
+          </a:xfrm>
+          <a:prstGeom prst="rect">
+            <a:avLst/>
+          </a:prstGeom>
+          <a:solidFill>
+            <a:schemeClr val="bg1"/>
+          </a:solidFill>
+          <a:ln w="12700">
+            <a:noFill/>
+          </a:ln>
+        </p:spPr>
+        <p:style>
+          <a:lnRef idx="2">
+            <a:schemeClr val="accent1">
+              <a:shade val="50000"/>
+            </a:schemeClr>
+          </a:lnRef>
+          <a:fillRef idx="1">
+            <a:schemeClr val="accent1"/>
+          </a:fillRef>
+          <a:effectRef idx="0">
+            <a:schemeClr val="accent1"/>
+          </a:effectRef>
+          <a:fontRef idx="minor">
+            <a:schemeClr val="lt1"/>
+          </a:fontRef>
+        </p:style>
+      </p:sp>
+      <p:sp>
+        <p:nvSpPr>
+          <p:cNvPr id="12" name="Rectangle 11">
+            <a:extLst>
+              <a:ext uri="{FF2B5EF4-FFF2-40B4-BE49-F238E27FC236}">
+                <a16:creationId xmlns:a16="http://schemas.microsoft.com/office/drawing/2014/main" id="{DDB95FCF-AD96-482F-9FB8-CD95725E6EFF}"/>
+              </a:ext>
+              <a:ext uri="{C183D7F6-B498-43B3-948B-1728B52AA6E4}">
+                <adec:decorative xmlns:adec="http://schemas.microsoft.com/office/drawing/2017/decorative" val="1"/>
+              </a:ext>
+            </a:extLst>
+          </p:cNvPr>
+          <p:cNvSpPr>
+            <a:spLocks noGrp="1" noRot="1" noChangeAspect="1" noMove="1" noResize="1" noEditPoints="1" noAdjustHandles="1" noChangeArrowheads="1" noChangeShapeType="1" noTextEdit="1"/>
+          </p:cNvSpPr>
+          <p:nvPr>
+            <p:extLst>
+              <p:ext uri="{386F3935-93C4-4BCD-93E2-E3B085C9AB24}">
+                <p16:designElem xmlns:p16="http://schemas.microsoft.com/office/powerpoint/2015/main" val="1"/>
+              </p:ext>
+            </p:extLst>
+          </p:nvPr>
+        </p:nvSpPr>
+        <p:spPr>
+          <a:xfrm>
+            <a:off x="346710" y="365760"/>
+            <a:ext cx="17586960" cy="9566908"/>
+          </a:xfrm>
+          <a:prstGeom prst="rect">
+            <a:avLst/>
+          </a:prstGeom>
+          <a:solidFill>
+            <a:schemeClr val="accent1"/>
+          </a:solidFill>
+          <a:ln w="12700">
+            <a:solidFill>
+              <a:srgbClr val="FFFFFF"/>
+            </a:solidFill>
+          </a:ln>
+        </p:spPr>
+        <p:style>
+          <a:lnRef idx="2">
+            <a:schemeClr val="accent1">
+              <a:shade val="50000"/>
+            </a:schemeClr>
+          </a:lnRef>
+          <a:fillRef idx="1">
+            <a:schemeClr val="accent1"/>
+          </a:fillRef>
+          <a:effectRef idx="0">
+            <a:schemeClr val="accent1"/>
+          </a:effectRef>
+          <a:fontRef idx="minor">
+            <a:schemeClr val="lt1"/>
+          </a:fontRef>
+        </p:style>
+      </p:sp>
+      <p:cxnSp>
+        <p:nvCxnSpPr>
+          <p:cNvPr id="14" name="Straight Connector 13">
+            <a:extLst>
+              <a:ext uri="{FF2B5EF4-FFF2-40B4-BE49-F238E27FC236}">
+                <a16:creationId xmlns:a16="http://schemas.microsoft.com/office/drawing/2014/main" id="{64EEEC00-AD80-4734-BEE6-04CBDEC830C9}"/>
+              </a:ext>
+              <a:ext uri="{C183D7F6-B498-43B3-948B-1728B52AA6E4}">
+                <adec:decorative xmlns:adec="http://schemas.microsoft.com/office/drawing/2017/decorative" val="1"/>
+              </a:ext>
+            </a:extLst>
+          </p:cNvPr>
+          <p:cNvCxnSpPr>
+            <a:cxnSpLocks noGrp="1" noRot="1" noChangeAspect="1" noMove="1" noResize="1" noEditPoints="1" noAdjustHandles="1" noChangeArrowheads="1" noChangeShapeType="1"/>
+          </p:cNvCxnSpPr>
+          <p:nvPr>
+            <p:extLst>
+              <p:ext uri="{386F3935-93C4-4BCD-93E2-E3B085C9AB24}">
+                <p16:designElem xmlns:p16="http://schemas.microsoft.com/office/powerpoint/2015/main" val="1"/>
+              </p:ext>
+            </p:extLst>
+          </p:nvPr>
+        </p:nvCxnSpPr>
+        <p:spPr>
+          <a:xfrm>
+            <a:off x="2967990" y="5600700"/>
+            <a:ext cx="12344401" cy="0"/>
+          </a:xfrm>
+          <a:prstGeom prst="line">
+            <a:avLst/>
+          </a:prstGeom>
+          <a:ln>
+            <a:solidFill>
+              <a:srgbClr val="FFFFFF"/>
+            </a:solidFill>
+          </a:ln>
+        </p:spPr>
+        <p:style>
+          <a:lnRef idx="1">
+            <a:schemeClr val="accent1"/>
+          </a:lnRef>
+          <a:fillRef idx="0">
+            <a:schemeClr val="accent1"/>
+          </a:fillRef>
+          <a:effectRef idx="0">
+            <a:schemeClr val="accent1"/>
+          </a:effectRef>
+          <a:fontRef idx="minor">
+            <a:schemeClr val="tx1"/>
+          </a:fontRef>
+        </p:style>
+      </p:cxnSp>
+      <p:sp>
+        <p:nvSpPr>
+          <p:cNvPr id="16" name="Rectangle 15">
+            <a:extLst>
+              <a:ext uri="{FF2B5EF4-FFF2-40B4-BE49-F238E27FC236}">
+                <a16:creationId xmlns:a16="http://schemas.microsoft.com/office/drawing/2014/main" id="{2ED84DD6-8A68-4994-8094-8DDBE89BF353}"/>
+              </a:ext>
+              <a:ext uri="{C183D7F6-B498-43B3-948B-1728B52AA6E4}">
+                <adec:decorative xmlns:adec="http://schemas.microsoft.com/office/drawing/2017/decorative" val="1"/>
+              </a:ext>
+            </a:extLst>
+          </p:cNvPr>
+          <p:cNvSpPr>
+            <a:spLocks noGrp="1" noRot="1" noChangeAspect="1" noMove="1" noResize="1" noEditPoints="1" noAdjustHandles="1" noChangeArrowheads="1" noChangeShapeType="1" noTextEdit="1"/>
+          </p:cNvSpPr>
+          <p:nvPr>
+            <p:extLst>
+              <p:ext uri="{386F3935-93C4-4BCD-93E2-E3B085C9AB24}">
+                <p16:designElem xmlns:p16="http://schemas.microsoft.com/office/powerpoint/2015/main" val="1"/>
+              </p:ext>
+            </p:extLst>
+          </p:nvPr>
+        </p:nvSpPr>
+        <p:spPr>
+          <a:xfrm>
+            <a:off x="346710" y="365760"/>
+            <a:ext cx="17583150" cy="9566908"/>
+          </a:xfrm>
+          <a:prstGeom prst="rect">
+            <a:avLst/>
+          </a:prstGeom>
+          <a:solidFill>
+            <a:schemeClr val="bg1"/>
+          </a:solidFill>
+          <a:ln w="12700">
+            <a:solidFill>
+              <a:srgbClr val="FFFFFF"/>
+            </a:solidFill>
+          </a:ln>
+        </p:spPr>
+        <p:style>
+          <a:lnRef idx="2">
+            <a:schemeClr val="accent1">
+              <a:shade val="50000"/>
+            </a:schemeClr>
+          </a:lnRef>
+          <a:fillRef idx="1">
+            <a:schemeClr val="accent1"/>
+          </a:fillRef>
+          <a:effectRef idx="0">
+            <a:schemeClr val="accent1"/>
+          </a:effectRef>
+          <a:fontRef idx="minor">
+            <a:schemeClr val="lt1"/>
+          </a:fontRef>
+        </p:style>
+      </p:sp>
+      <p:sp>
+        <p:nvSpPr>
+          <p:cNvPr id="18" name="Rectangle 17">
+            <a:extLst>
+              <a:ext uri="{FF2B5EF4-FFF2-40B4-BE49-F238E27FC236}">
+                <a16:creationId xmlns:a16="http://schemas.microsoft.com/office/drawing/2014/main" id="{176049D7-366E-4AC9-B689-460CC28F8E70}"/>
+              </a:ext>
+              <a:ext uri="{C183D7F6-B498-43B3-948B-1728B52AA6E4}">
+                <adec:decorative xmlns:adec="http://schemas.microsoft.com/office/drawing/2017/decorative" val="1"/>
+              </a:ext>
+            </a:extLst>
+          </p:cNvPr>
+          <p:cNvSpPr>
+            <a:spLocks noGrp="1" noRot="1" noChangeAspect="1" noMove="1" noResize="1" noEditPoints="1" noAdjustHandles="1" noChangeArrowheads="1" noChangeShapeType="1" noTextEdit="1"/>
+          </p:cNvSpPr>
+          <p:nvPr>
+            <p:extLst>
+              <p:ext uri="{386F3935-93C4-4BCD-93E2-E3B085C9AB24}">
+                <p16:designElem xmlns:p16="http://schemas.microsoft.com/office/powerpoint/2015/main" val="1"/>
+              </p:ext>
+            </p:extLst>
+          </p:nvPr>
+        </p:nvSpPr>
+        <p:spPr>
+          <a:xfrm>
+            <a:off x="11329416" y="370330"/>
+            <a:ext cx="6596632" cy="9566909"/>
+          </a:xfrm>
+          <a:prstGeom prst="rect">
+            <a:avLst/>
+          </a:prstGeom>
+          <a:solidFill>
+            <a:srgbClr val="A6B727"/>
+          </a:solidFill>
+          <a:ln w="12700">
+            <a:solidFill>
+              <a:srgbClr val="FFFFFF"/>
+            </a:solidFill>
+          </a:ln>
+        </p:spPr>
+        <p:style>
+          <a:lnRef idx="2">
+            <a:schemeClr val="accent1">
+              <a:shade val="50000"/>
+            </a:schemeClr>
+          </a:lnRef>
+          <a:fillRef idx="1">
+            <a:schemeClr val="accent1"/>
+          </a:fillRef>
+          <a:effectRef idx="0">
+            <a:schemeClr val="accent1"/>
+          </a:effectRef>
+          <a:fontRef idx="minor">
+            <a:schemeClr val="lt1"/>
+          </a:fontRef>
+        </p:style>
+      </p:sp>
+      <p:cxnSp>
+        <p:nvCxnSpPr>
+          <p:cNvPr id="20" name="Straight Connector 19">
+            <a:extLst>
+              <a:ext uri="{FF2B5EF4-FFF2-40B4-BE49-F238E27FC236}">
+                <a16:creationId xmlns:a16="http://schemas.microsoft.com/office/drawing/2014/main" id="{BC9E91F8-C4AE-4EB0-8B76-FF3F3FC7183D}"/>
+              </a:ext>
+              <a:ext uri="{C183D7F6-B498-43B3-948B-1728B52AA6E4}">
+                <adec:decorative xmlns:adec="http://schemas.microsoft.com/office/drawing/2017/decorative" val="1"/>
+              </a:ext>
+            </a:extLst>
+          </p:cNvPr>
+          <p:cNvCxnSpPr>
+            <a:cxnSpLocks noGrp="1" noRot="1" noChangeAspect="1" noMove="1" noResize="1" noEditPoints="1" noAdjustHandles="1" noChangeArrowheads="1" noChangeShapeType="1"/>
+          </p:cNvCxnSpPr>
+          <p:nvPr>
+            <p:extLst>
+              <p:ext uri="{386F3935-93C4-4BCD-93E2-E3B085C9AB24}">
+                <p16:designElem xmlns:p16="http://schemas.microsoft.com/office/powerpoint/2015/main" val="1"/>
+              </p:ext>
+            </p:extLst>
+          </p:nvPr>
+        </p:nvCxnSpPr>
+        <p:spPr>
+          <a:xfrm>
+            <a:off x="12555426" y="6608794"/>
+            <a:ext cx="4144612" cy="0"/>
+          </a:xfrm>
+          <a:prstGeom prst="line">
+            <a:avLst/>
+          </a:prstGeom>
+          <a:ln>
+            <a:solidFill>
+              <a:srgbClr val="FFFFFF"/>
+            </a:solidFill>
+          </a:ln>
+        </p:spPr>
+        <p:style>
+          <a:lnRef idx="1">
+            <a:schemeClr val="accent1"/>
+          </a:lnRef>
+          <a:fillRef idx="0">
+            <a:schemeClr val="accent1"/>
+          </a:fillRef>
+          <a:effectRef idx="0">
+            <a:schemeClr val="accent1"/>
+          </a:effectRef>
+          <a:fontRef idx="minor">
+            <a:schemeClr val="tx1"/>
+          </a:fontRef>
+        </p:style>
+      </p:cxnSp>
+      <p:sp>
+        <p:nvSpPr>
+          <p:cNvPr id="22" name="Rectangle 21">
+            <a:extLst>
+              <a:ext uri="{FF2B5EF4-FFF2-40B4-BE49-F238E27FC236}">
+                <a16:creationId xmlns:a16="http://schemas.microsoft.com/office/drawing/2014/main" id="{4AD45A04-4150-4943-BB06-EEEDDD73BFCE}"/>
+              </a:ext>
+              <a:ext uri="{C183D7F6-B498-43B3-948B-1728B52AA6E4}">
+                <adec:decorative xmlns:adec="http://schemas.microsoft.com/office/drawing/2017/decorative" val="1"/>
+              </a:ext>
+            </a:extLst>
+          </p:cNvPr>
+          <p:cNvSpPr>
+            <a:spLocks noGrp="1" noRot="1" noChangeAspect="1" noMove="1" noResize="1" noEditPoints="1" noAdjustHandles="1" noChangeArrowheads="1" noChangeShapeType="1" noTextEdit="1"/>
+          </p:cNvSpPr>
+          <p:nvPr>
+            <p:extLst>
+              <p:ext uri="{386F3935-93C4-4BCD-93E2-E3B085C9AB24}">
+                <p16:designElem xmlns:p16="http://schemas.microsoft.com/office/powerpoint/2015/main" val="1"/>
+              </p:ext>
+            </p:extLst>
+          </p:nvPr>
+        </p:nvSpPr>
+        <p:spPr>
+          <a:xfrm>
+            <a:off x="342900" y="370332"/>
+            <a:ext cx="17586960" cy="9566908"/>
+          </a:xfrm>
+          <a:prstGeom prst="rect">
+            <a:avLst/>
+          </a:prstGeom>
+          <a:noFill/>
+          <a:ln w="12700">
+            <a:solidFill>
+              <a:srgbClr val="FFFFFF"/>
+            </a:solidFill>
+          </a:ln>
+        </p:spPr>
+        <p:style>
+          <a:lnRef idx="2">
+            <a:schemeClr val="accent1">
+              <a:shade val="50000"/>
+            </a:schemeClr>
+          </a:lnRef>
+          <a:fillRef idx="1">
+            <a:schemeClr val="accent1"/>
+          </a:fillRef>
+          <a:effectRef idx="0">
+            <a:schemeClr val="accent1"/>
+          </a:effectRef>
+          <a:fontRef idx="minor">
+            <a:schemeClr val="lt1"/>
+          </a:fontRef>
+        </p:style>
+        <p:txBody>
+          <a:bodyPr/>
+          <a:lstStyle/>
+          <a:p>
+            <a:endParaRPr lang="en-US" dirty="0"/>
+          </a:p>
+        </p:txBody>
+      </p:sp>
+      <p:sp>
+        <p:nvSpPr>
+          <p:cNvPr id="2" name="Title 1">
+            <a:extLst>
+              <a:ext uri="{FF2B5EF4-FFF2-40B4-BE49-F238E27FC236}">
+                <a16:creationId xmlns:a16="http://schemas.microsoft.com/office/drawing/2014/main" id="{85A616C5-BB5E-029D-FF21-6D60BCB665AB}"/>
+              </a:ext>
+            </a:extLst>
+          </p:cNvPr>
+          <p:cNvSpPr>
+            <a:spLocks noGrp="1"/>
+          </p:cNvSpPr>
+          <p:nvPr>
+            <p:ph type="title"/>
+          </p:nvPr>
+        </p:nvSpPr>
+        <p:spPr>
+          <a:xfrm>
+            <a:off x="12292707" y="1286512"/>
+            <a:ext cx="4670049" cy="5434266"/>
+          </a:xfrm>
+        </p:spPr>
+        <p:txBody>
+          <a:bodyPr vert="horz" lIns="91440" tIns="45720" rIns="91440" bIns="45720" rtlCol="0" anchor="b">
+            <a:normAutofit/>
+          </a:bodyPr>
+          <a:lstStyle/>
+          <a:p>
+            <a:pPr algn="ctr" defTabSz="914400">
+              <a:lnSpc>
+                <a:spcPct val="85000"/>
+              </a:lnSpc>
+            </a:pPr>
+            <a:r>
+              <a:rPr lang="en-US" sz="6900" b="1" cap="all">
+                <a:solidFill>
+                  <a:srgbClr val="FFFFFF"/>
+                </a:solidFill>
+              </a:rPr>
+              <a:t>Success! Gibberish</a:t>
+            </a:r>
+          </a:p>
+        </p:txBody>
+      </p:sp>
+      <p:pic>
+        <p:nvPicPr>
+          <p:cNvPr id="5" name="Content Placeholder 4">
+            <a:extLst>
+              <a:ext uri="{FF2B5EF4-FFF2-40B4-BE49-F238E27FC236}">
+                <a16:creationId xmlns:a16="http://schemas.microsoft.com/office/drawing/2014/main" id="{CC8D509C-9BF4-E541-559E-2F8E0F953053}"/>
+              </a:ext>
+            </a:extLst>
+          </p:cNvPr>
+          <p:cNvPicPr>
+            <a:picLocks noGrp="1" noChangeAspect="1"/>
+          </p:cNvPicPr>
+          <p:nvPr>
+            <p:ph idx="1"/>
+          </p:nvPr>
+        </p:nvPicPr>
+        <p:blipFill>
+          <a:blip r:embed="rId3"/>
+          <a:stretch>
+            <a:fillRect/>
+          </a:stretch>
+        </p:blipFill>
+        <p:spPr>
+          <a:xfrm>
+            <a:off x="1308096" y="1344637"/>
+            <a:ext cx="9068364" cy="7594753"/>
+          </a:xfrm>
+          <a:prstGeom prst="rect">
+            <a:avLst/>
+          </a:prstGeom>
+        </p:spPr>
+      </p:pic>
+    </p:spTree>
+    <p:extLst>
+      <p:ext uri="{BB962C8B-B14F-4D97-AF65-F5344CB8AC3E}">
+        <p14:creationId xmlns:p14="http://schemas.microsoft.com/office/powerpoint/2010/main" val="2788088831"/>
+      </p:ext>
+    </p:extLst>
+  </p:cSld>
+  <p:clrMapOvr>
+    <a:masterClrMapping/>
+  </p:clrMapOvr>
+</p:sld>
+</file>
+
+<file path=ppt/slides/slide77.xml><?xml version="1.0" encoding="utf-8"?>
+<p:sld xmlns:a="http://schemas.openxmlformats.org/drawingml/2006/main" xmlns:r="http://schemas.openxmlformats.org/officeDocument/2006/relationships" xmlns:p="http://schemas.openxmlformats.org/presentationml/2006/main">
+  <p:cSld>
+    <p:spTree>
+      <p:nvGrpSpPr>
+        <p:cNvPr id="1" name=""/>
+        <p:cNvGrpSpPr/>
+        <p:nvPr/>
+      </p:nvGrpSpPr>
+      <p:grpSpPr>
+        <a:xfrm>
+          <a:off x="0" y="0"/>
+          <a:ext cx="0" cy="0"/>
+          <a:chOff x="0" y="0"/>
+          <a:chExt cx="0" cy="0"/>
+        </a:xfrm>
+      </p:grpSpPr>
+      <p:sp>
+        <p:nvSpPr>
+          <p:cNvPr id="2" name="Title 1">
+            <a:extLst>
+              <a:ext uri="{FF2B5EF4-FFF2-40B4-BE49-F238E27FC236}">
+                <a16:creationId xmlns:a16="http://schemas.microsoft.com/office/drawing/2014/main" id="{DDE6391E-A4F7-B642-89FF-6045C4099658}"/>
+              </a:ext>
+            </a:extLst>
+          </p:cNvPr>
+          <p:cNvSpPr>
+            <a:spLocks noGrp="1"/>
+          </p:cNvSpPr>
+          <p:nvPr>
+            <p:ph type="title"/>
+          </p:nvPr>
+        </p:nvSpPr>
+        <p:spPr/>
+        <p:txBody>
+          <a:bodyPr/>
+          <a:lstStyle/>
+          <a:p>
+            <a:r>
+              <a:rPr lang="en-CA" dirty="0"/>
+              <a:t>Testing from Command Prompt</a:t>
+            </a:r>
+          </a:p>
+        </p:txBody>
+      </p:sp>
+      <p:pic>
+        <p:nvPicPr>
+          <p:cNvPr id="5" name="Content Placeholder 4">
+            <a:extLst>
+              <a:ext uri="{FF2B5EF4-FFF2-40B4-BE49-F238E27FC236}">
+                <a16:creationId xmlns:a16="http://schemas.microsoft.com/office/drawing/2014/main" id="{535F312C-794C-382D-B49E-D7DB89B60705}"/>
+              </a:ext>
+            </a:extLst>
+          </p:cNvPr>
+          <p:cNvPicPr>
+            <a:picLocks noGrp="1" noChangeAspect="1"/>
+          </p:cNvPicPr>
+          <p:nvPr>
+            <p:ph idx="1"/>
+          </p:nvPr>
+        </p:nvPicPr>
+        <p:blipFill>
+          <a:blip r:embed="rId2"/>
+          <a:stretch>
+            <a:fillRect/>
+          </a:stretch>
+        </p:blipFill>
+        <p:spPr>
+          <a:xfrm>
+            <a:off x="4228384" y="3086100"/>
+            <a:ext cx="9782019" cy="6057900"/>
+          </a:xfrm>
+        </p:spPr>
+      </p:pic>
+    </p:spTree>
+    <p:extLst>
+      <p:ext uri="{BB962C8B-B14F-4D97-AF65-F5344CB8AC3E}">
+        <p14:creationId xmlns:p14="http://schemas.microsoft.com/office/powerpoint/2010/main" val="1876291039"/>
+      </p:ext>
+    </p:extLst>
+  </p:cSld>
+  <p:clrMapOvr>
+    <a:masterClrMapping/>
+  </p:clrMapOvr>
+</p:sld>
+</file>
+
+<file path=ppt/slides/slide78.xml><?xml version="1.0" encoding="utf-8"?>
+<p:sld xmlns:a="http://schemas.openxmlformats.org/drawingml/2006/main" xmlns:r="http://schemas.openxmlformats.org/officeDocument/2006/relationships" xmlns:p="http://schemas.openxmlformats.org/presentationml/2006/main">
+  <p:cSld>
+    <p:spTree>
+      <p:nvGrpSpPr>
+        <p:cNvPr id="1" name=""/>
+        <p:cNvGrpSpPr/>
+        <p:nvPr/>
+      </p:nvGrpSpPr>
+      <p:grpSpPr>
+        <a:xfrm>
+          <a:off x="0" y="0"/>
+          <a:ext cx="0" cy="0"/>
+          <a:chOff x="0" y="0"/>
+          <a:chExt cx="0" cy="0"/>
+        </a:xfrm>
+      </p:grpSpPr>
+      <p:sp>
+        <p:nvSpPr>
+          <p:cNvPr id="2" name="Title 1">
+            <a:extLst>
+              <a:ext uri="{FF2B5EF4-FFF2-40B4-BE49-F238E27FC236}">
+                <a16:creationId xmlns:a16="http://schemas.microsoft.com/office/drawing/2014/main" id="{B6E47AA5-95B7-6518-CEC8-232C5CB6960B}"/>
+              </a:ext>
+            </a:extLst>
+          </p:cNvPr>
+          <p:cNvSpPr>
+            <a:spLocks noGrp="1"/>
+          </p:cNvSpPr>
+          <p:nvPr>
+            <p:ph type="title"/>
+          </p:nvPr>
+        </p:nvSpPr>
+        <p:spPr/>
+        <p:txBody>
+          <a:bodyPr/>
+          <a:lstStyle/>
+          <a:p>
+            <a:r>
+              <a:rPr lang="en-CA" dirty="0"/>
+              <a:t>I wrote a console app for Julius Caesar</a:t>
+            </a:r>
+          </a:p>
+        </p:txBody>
+      </p:sp>
+      <p:pic>
+        <p:nvPicPr>
+          <p:cNvPr id="5" name="Content Placeholder 4">
+            <a:extLst>
+              <a:ext uri="{FF2B5EF4-FFF2-40B4-BE49-F238E27FC236}">
+                <a16:creationId xmlns:a16="http://schemas.microsoft.com/office/drawing/2014/main" id="{4FCDE6C3-E65F-440C-84C3-949EA1D7942B}"/>
+              </a:ext>
+            </a:extLst>
+          </p:cNvPr>
+          <p:cNvPicPr>
+            <a:picLocks noGrp="1" noChangeAspect="1"/>
+          </p:cNvPicPr>
+          <p:nvPr>
+            <p:ph idx="1"/>
+          </p:nvPr>
+        </p:nvPicPr>
+        <p:blipFill>
+          <a:blip r:embed="rId2"/>
+          <a:stretch>
+            <a:fillRect/>
+          </a:stretch>
+        </p:blipFill>
+        <p:spPr>
+          <a:xfrm>
+            <a:off x="2895600" y="3223261"/>
+            <a:ext cx="12277218" cy="4114800"/>
+          </a:xfrm>
+        </p:spPr>
+      </p:pic>
+    </p:spTree>
+    <p:extLst>
+      <p:ext uri="{BB962C8B-B14F-4D97-AF65-F5344CB8AC3E}">
+        <p14:creationId xmlns:p14="http://schemas.microsoft.com/office/powerpoint/2010/main" val="2875147135"/>
       </p:ext>
     </p:extLst>
   </p:cSld>

</xml_diff>